<commit_message>
changes up through 30ish
</commit_message>
<xml_diff>
--- a/Slides/PH223_Lecture_33.pptx
+++ b/Slides/PH223_Lecture_33.pptx
@@ -158,7 +158,7 @@
   <pc:docChgLst>
     <pc:chgData name="Lines, Todd" userId="afaf7c3a-e8aa-4568-882a-02ad8f9e19b0" providerId="ADAL" clId="{18C51731-65D7-4D63-A13A-C35379499D4F}"/>
     <pc:docChg chg="undo custSel addSld delSld modSld sldOrd">
-      <pc:chgData name="Lines, Todd" userId="afaf7c3a-e8aa-4568-882a-02ad8f9e19b0" providerId="ADAL" clId="{18C51731-65D7-4D63-A13A-C35379499D4F}" dt="2023-11-05T00:16:00.764" v="1447" actId="14100"/>
+      <pc:chgData name="Lines, Todd" userId="afaf7c3a-e8aa-4568-882a-02ad8f9e19b0" providerId="ADAL" clId="{18C51731-65D7-4D63-A13A-C35379499D4F}" dt="2023-11-06T17:13:03.033" v="1452" actId="20577"/>
       <pc:docMkLst>
         <pc:docMk/>
       </pc:docMkLst>
@@ -393,12 +393,20 @@
           </ac:graphicFrameMkLst>
         </pc:graphicFrameChg>
       </pc:sldChg>
-      <pc:sldChg chg="add">
-        <pc:chgData name="Lines, Todd" userId="afaf7c3a-e8aa-4568-882a-02ad8f9e19b0" providerId="ADAL" clId="{18C51731-65D7-4D63-A13A-C35379499D4F}" dt="2023-11-04T20:25:50.598" v="1"/>
+      <pc:sldChg chg="modSp add mod">
+        <pc:chgData name="Lines, Todd" userId="afaf7c3a-e8aa-4568-882a-02ad8f9e19b0" providerId="ADAL" clId="{18C51731-65D7-4D63-A13A-C35379499D4F}" dt="2023-11-06T17:13:03.033" v="1452" actId="20577"/>
         <pc:sldMkLst>
           <pc:docMk/>
           <pc:sldMk cId="0" sldId="1316"/>
         </pc:sldMkLst>
+        <pc:spChg chg="mod">
+          <ac:chgData name="Lines, Todd" userId="afaf7c3a-e8aa-4568-882a-02ad8f9e19b0" providerId="ADAL" clId="{18C51731-65D7-4D63-A13A-C35379499D4F}" dt="2023-11-06T17:13:03.033" v="1452" actId="20577"/>
+          <ac:spMkLst>
+            <pc:docMk/>
+            <pc:sldMk cId="0" sldId="1316"/>
+            <ac:spMk id="3" creationId="{00000000-0000-0000-0000-000000000000}"/>
+          </ac:spMkLst>
+        </pc:spChg>
       </pc:sldChg>
       <pc:sldChg chg="modSp add mod">
         <pc:chgData name="Lines, Todd" userId="afaf7c3a-e8aa-4568-882a-02ad8f9e19b0" providerId="ADAL" clId="{18C51731-65D7-4D63-A13A-C35379499D4F}" dt="2023-11-04T22:34:48.936" v="71" actId="20577"/>
@@ -2644,7 +2652,7 @@
             <a:fld id="{FF63C9FC-D98D-450F-8666-DAE5A2C35D6D}" type="datetimeFigureOut">
               <a:rPr lang="en-US" smtClean="0"/>
               <a:pPr/>
-              <a:t>11/4/2023</a:t>
+              <a:t>11/6/2023</a:t>
             </a:fld>
             <a:endParaRPr lang="en-US"/>
           </a:p>
@@ -2809,7 +2817,7 @@
             <a:fld id="{FF63C9FC-D98D-450F-8666-DAE5A2C35D6D}" type="datetimeFigureOut">
               <a:rPr lang="en-US" smtClean="0"/>
               <a:pPr/>
-              <a:t>11/4/2023</a:t>
+              <a:t>11/6/2023</a:t>
             </a:fld>
             <a:endParaRPr lang="en-US"/>
           </a:p>
@@ -2984,7 +2992,7 @@
             <a:fld id="{FF63C9FC-D98D-450F-8666-DAE5A2C35D6D}" type="datetimeFigureOut">
               <a:rPr lang="en-US" smtClean="0"/>
               <a:pPr/>
-              <a:t>11/4/2023</a:t>
+              <a:t>11/6/2023</a:t>
             </a:fld>
             <a:endParaRPr lang="en-US"/>
           </a:p>
@@ -3149,7 +3157,7 @@
             <a:fld id="{FF63C9FC-D98D-450F-8666-DAE5A2C35D6D}" type="datetimeFigureOut">
               <a:rPr lang="en-US" smtClean="0"/>
               <a:pPr/>
-              <a:t>11/4/2023</a:t>
+              <a:t>11/6/2023</a:t>
             </a:fld>
             <a:endParaRPr lang="en-US"/>
           </a:p>
@@ -3391,7 +3399,7 @@
             <a:fld id="{FF63C9FC-D98D-450F-8666-DAE5A2C35D6D}" type="datetimeFigureOut">
               <a:rPr lang="en-US" smtClean="0"/>
               <a:pPr/>
-              <a:t>11/4/2023</a:t>
+              <a:t>11/6/2023</a:t>
             </a:fld>
             <a:endParaRPr lang="en-US"/>
           </a:p>
@@ -3673,7 +3681,7 @@
             <a:fld id="{FF63C9FC-D98D-450F-8666-DAE5A2C35D6D}" type="datetimeFigureOut">
               <a:rPr lang="en-US" smtClean="0"/>
               <a:pPr/>
-              <a:t>11/4/2023</a:t>
+              <a:t>11/6/2023</a:t>
             </a:fld>
             <a:endParaRPr lang="en-US"/>
           </a:p>
@@ -4089,7 +4097,7 @@
             <a:fld id="{FF63C9FC-D98D-450F-8666-DAE5A2C35D6D}" type="datetimeFigureOut">
               <a:rPr lang="en-US" smtClean="0"/>
               <a:pPr/>
-              <a:t>11/4/2023</a:t>
+              <a:t>11/6/2023</a:t>
             </a:fld>
             <a:endParaRPr lang="en-US"/>
           </a:p>
@@ -4203,7 +4211,7 @@
             <a:fld id="{FF63C9FC-D98D-450F-8666-DAE5A2C35D6D}" type="datetimeFigureOut">
               <a:rPr lang="en-US" smtClean="0"/>
               <a:pPr/>
-              <a:t>11/4/2023</a:t>
+              <a:t>11/6/2023</a:t>
             </a:fld>
             <a:endParaRPr lang="en-US"/>
           </a:p>
@@ -4295,7 +4303,7 @@
             <a:fld id="{FF63C9FC-D98D-450F-8666-DAE5A2C35D6D}" type="datetimeFigureOut">
               <a:rPr lang="en-US" smtClean="0"/>
               <a:pPr/>
-              <a:t>11/4/2023</a:t>
+              <a:t>11/6/2023</a:t>
             </a:fld>
             <a:endParaRPr lang="en-US"/>
           </a:p>
@@ -4567,7 +4575,7 @@
             <a:fld id="{FF63C9FC-D98D-450F-8666-DAE5A2C35D6D}" type="datetimeFigureOut">
               <a:rPr lang="en-US" smtClean="0"/>
               <a:pPr/>
-              <a:t>11/4/2023</a:t>
+              <a:t>11/6/2023</a:t>
             </a:fld>
             <a:endParaRPr lang="en-US"/>
           </a:p>
@@ -4816,7 +4824,7 @@
             <a:fld id="{FF63C9FC-D98D-450F-8666-DAE5A2C35D6D}" type="datetimeFigureOut">
               <a:rPr lang="en-US" smtClean="0"/>
               <a:pPr/>
-              <a:t>11/4/2023</a:t>
+              <a:t>11/6/2023</a:t>
             </a:fld>
             <a:endParaRPr lang="en-US"/>
           </a:p>
@@ -5024,7 +5032,7 @@
             <a:fld id="{FF63C9FC-D98D-450F-8666-DAE5A2C35D6D}" type="datetimeFigureOut">
               <a:rPr lang="en-US" smtClean="0"/>
               <a:pPr/>
-              <a:t>11/4/2023</a:t>
+              <a:t>11/6/2023</a:t>
             </a:fld>
             <a:endParaRPr lang="en-US"/>
           </a:p>
@@ -5417,8 +5425,8 @@
           </a:p>
         </p:txBody>
       </p:sp>
-      <mc:AlternateContent xmlns:mc="http://schemas.openxmlformats.org/markup-compatibility/2006">
-        <mc:Choice xmlns:a14="http://schemas.microsoft.com/office/drawing/2010/main" Requires="a14">
+      <mc:AlternateContent xmlns:mc="http://schemas.openxmlformats.org/markup-compatibility/2006" xmlns:a14="http://schemas.microsoft.com/office/drawing/2010/main">
+        <mc:Choice Requires="a14">
           <p:sp>
             <p:nvSpPr>
               <p:cNvPr id="3" name="Content Placeholder 2"/>
@@ -5901,7 +5909,7 @@
             </p:txBody>
           </p:sp>
         </mc:Choice>
-        <mc:Fallback>
+        <mc:Fallback xmlns="">
           <p:sp>
             <p:nvSpPr>
               <p:cNvPr id="3" name="Content Placeholder 2"/>
@@ -7844,8 +7852,8 @@
           </a:p>
         </p:txBody>
       </p:sp>
-      <mc:AlternateContent xmlns:mc="http://schemas.openxmlformats.org/markup-compatibility/2006">
-        <mc:Choice xmlns:a14="http://schemas.microsoft.com/office/drawing/2010/main" Requires="a14">
+      <mc:AlternateContent xmlns:mc="http://schemas.openxmlformats.org/markup-compatibility/2006" xmlns:a14="http://schemas.microsoft.com/office/drawing/2010/main">
+        <mc:Choice Requires="a14">
           <p:sp>
             <p:nvSpPr>
               <p:cNvPr id="3" name="Content Placeholder 2">
@@ -8164,7 +8172,7 @@
             </p:txBody>
           </p:sp>
         </mc:Choice>
-        <mc:Fallback>
+        <mc:Fallback xmlns="">
           <p:sp>
             <p:nvSpPr>
               <p:cNvPr id="3" name="Content Placeholder 2">
@@ -16267,8 +16275,8 @@
           </a:p>
         </p:txBody>
       </p:sp>
-      <mc:AlternateContent xmlns:mc="http://schemas.openxmlformats.org/markup-compatibility/2006">
-        <mc:Choice xmlns:a14="http://schemas.microsoft.com/office/drawing/2010/main" Requires="a14">
+      <mc:AlternateContent xmlns:mc="http://schemas.openxmlformats.org/markup-compatibility/2006" xmlns:a14="http://schemas.microsoft.com/office/drawing/2010/main">
+        <mc:Choice Requires="a14">
           <p:sp>
             <p:nvSpPr>
               <p:cNvPr id="3" name="Content Placeholder 2"/>
@@ -16317,14 +16325,7 @@
                         <a:latin typeface="Cambria Math" panose="02040503050406030204" pitchFamily="18" charset="0"/>
                         <a:ea typeface="Cambria Math" panose="02040503050406030204" pitchFamily="18" charset="0"/>
                       </a:rPr>
-                      <m:t>=</m:t>
-                    </m:r>
-                    <m:r>
-                      <a:rPr lang="en-US" b="0" i="1" smtClean="0">
-                        <a:latin typeface="Cambria Math" panose="02040503050406030204" pitchFamily="18" charset="0"/>
-                        <a:ea typeface="Cambria Math" panose="02040503050406030204" pitchFamily="18" charset="0"/>
-                      </a:rPr>
-                      <m:t>−</m:t>
+                      <m:t>=−</m:t>
                     </m:r>
                     <m:f>
                       <m:fPr>
@@ -16720,7 +16721,7 @@
             </p:txBody>
           </p:sp>
         </mc:Choice>
-        <mc:Fallback>
+        <mc:Fallback xmlns="">
           <p:sp>
             <p:nvSpPr>
               <p:cNvPr id="3" name="Content Placeholder 2"/>
@@ -18507,8 +18508,8 @@
           </a:p>
         </p:txBody>
       </p:sp>
-      <mc:AlternateContent xmlns:mc="http://schemas.openxmlformats.org/markup-compatibility/2006">
-        <mc:Choice xmlns:a14="http://schemas.microsoft.com/office/drawing/2010/main" Requires="a14">
+      <mc:AlternateContent xmlns:mc="http://schemas.openxmlformats.org/markup-compatibility/2006" xmlns:a14="http://schemas.microsoft.com/office/drawing/2010/main">
+        <mc:Choice Requires="a14">
           <p:sp>
             <p:nvSpPr>
               <p:cNvPr id="3" name="TextBox 2">
@@ -18872,7 +18873,7 @@
             </p:txBody>
           </p:sp>
         </mc:Choice>
-        <mc:Fallback>
+        <mc:Fallback xmlns="">
           <p:sp>
             <p:nvSpPr>
               <p:cNvPr id="3" name="TextBox 2">
@@ -18947,8 +18948,8 @@
           <a:chExt cx="0" cy="0"/>
         </a:xfrm>
       </p:grpSpPr>
-      <mc:AlternateContent xmlns:mc="http://schemas.openxmlformats.org/markup-compatibility/2006">
-        <mc:Choice xmlns:a14="http://schemas.microsoft.com/office/drawing/2010/main" Requires="a14">
+      <mc:AlternateContent xmlns:mc="http://schemas.openxmlformats.org/markup-compatibility/2006" xmlns:a14="http://schemas.microsoft.com/office/drawing/2010/main">
+        <mc:Choice Requires="a14">
           <p:sp>
             <p:nvSpPr>
               <p:cNvPr id="5" name="TextBox 4">
@@ -19438,7 +19439,7 @@
             </p:txBody>
           </p:sp>
         </mc:Choice>
-        <mc:Fallback>
+        <mc:Fallback xmlns="">
           <p:sp>
             <p:nvSpPr>
               <p:cNvPr id="5" name="TextBox 4">
@@ -19716,8 +19717,8 @@
           </a:prstGeom>
         </p:spPr>
       </p:pic>
-      <mc:AlternateContent xmlns:mc="http://schemas.openxmlformats.org/markup-compatibility/2006">
-        <mc:Choice xmlns:a14="http://schemas.microsoft.com/office/drawing/2010/main" Requires="a14">
+      <mc:AlternateContent xmlns:mc="http://schemas.openxmlformats.org/markup-compatibility/2006" xmlns:a14="http://schemas.microsoft.com/office/drawing/2010/main">
+        <mc:Choice Requires="a14">
           <p:sp>
             <p:nvSpPr>
               <p:cNvPr id="9" name="TextBox 8">
@@ -20045,7 +20046,7 @@
             </p:txBody>
           </p:sp>
         </mc:Choice>
-        <mc:Fallback>
+        <mc:Fallback xmlns="">
           <p:sp>
             <p:nvSpPr>
               <p:cNvPr id="9" name="TextBox 8">
@@ -20353,8 +20354,8 @@
           </a:p>
         </p:txBody>
       </p:sp>
-      <mc:AlternateContent xmlns:mc="http://schemas.openxmlformats.org/markup-compatibility/2006">
-        <mc:Choice xmlns:a14="http://schemas.microsoft.com/office/drawing/2010/main" Requires="a14">
+      <mc:AlternateContent xmlns:mc="http://schemas.openxmlformats.org/markup-compatibility/2006" xmlns:a14="http://schemas.microsoft.com/office/drawing/2010/main">
+        <mc:Choice Requires="a14">
           <p:sp>
             <p:nvSpPr>
               <p:cNvPr id="9" name="TextBox 8">
@@ -20899,7 +20900,7 @@
             </p:txBody>
           </p:sp>
         </mc:Choice>
-        <mc:Fallback>
+        <mc:Fallback xmlns="">
           <p:sp>
             <p:nvSpPr>
               <p:cNvPr id="9" name="TextBox 8">
@@ -21155,8 +21156,8 @@
           </a:p>
         </p:txBody>
       </p:sp>
-      <mc:AlternateContent xmlns:mc="http://schemas.openxmlformats.org/markup-compatibility/2006">
-        <mc:Choice xmlns:a14="http://schemas.microsoft.com/office/drawing/2010/main" Requires="a14">
+      <mc:AlternateContent xmlns:mc="http://schemas.openxmlformats.org/markup-compatibility/2006" xmlns:a14="http://schemas.microsoft.com/office/drawing/2010/main">
+        <mc:Choice Requires="a14">
           <p:sp>
             <p:nvSpPr>
               <p:cNvPr id="9" name="TextBox 8">
@@ -21421,7 +21422,7 @@
             </p:txBody>
           </p:sp>
         </mc:Choice>
-        <mc:Fallback>
+        <mc:Fallback xmlns="">
           <p:sp>
             <p:nvSpPr>
               <p:cNvPr id="9" name="TextBox 8">
@@ -21914,8 +21915,8 @@
           </a:p>
         </p:txBody>
       </p:sp>
-      <mc:AlternateContent xmlns:mc="http://schemas.openxmlformats.org/markup-compatibility/2006">
-        <mc:Choice xmlns:a14="http://schemas.microsoft.com/office/drawing/2010/main" Requires="a14">
+      <mc:AlternateContent xmlns:mc="http://schemas.openxmlformats.org/markup-compatibility/2006" xmlns:a14="http://schemas.microsoft.com/office/drawing/2010/main">
+        <mc:Choice Requires="a14">
           <p:sp>
             <p:nvSpPr>
               <p:cNvPr id="5" name="Object 1">
@@ -22201,7 +22202,7 @@
             </p:txBody>
           </p:sp>
         </mc:Choice>
-        <mc:Fallback>
+        <mc:Fallback xmlns="">
           <p:sp>
             <p:nvSpPr>
               <p:cNvPr id="5" name="Object 1">
@@ -22368,7 +22369,7 @@
             </a:r>
             <a:r>
               <a:rPr lang="en-US" dirty="0"/>
-              <a:t> in that direction.</a:t>
+              <a:t> is in that direction.</a:t>
             </a:r>
           </a:p>
           <a:p>

</xml_diff>